<commit_message>
Gestión de clientes y relación a facturas
</commit_message>
<xml_diff>
--- a/designs.pptx
+++ b/designs.pptx
@@ -107,6 +107,11 @@
       </a:defRPr>
     </a:lvl9pPr>
   </p:defaultTextStyle>
+  <p:extLst>
+    <p:ext uri="{EFAFB233-063F-42B5-8137-9DF3F51BA10A}">
+      <p15:sldGuideLst xmlns:p15="http://schemas.microsoft.com/office/powerpoint/2012/main"/>
+    </p:ext>
+  </p:extLst>
 </p:presentation>
 </file>
 
@@ -241,7 +246,7 @@
           <a:p>
             <a:fld id="{ED6E0A59-74F8-478C-B1F8-38E54AC6DFA7}" type="datetimeFigureOut">
               <a:rPr lang="es-CO" smtClean="0"/>
-              <a:t>27/03/2018</a:t>
+              <a:t>30/03/2018</a:t>
             </a:fld>
             <a:endParaRPr lang="es-CO"/>
           </a:p>
@@ -411,7 +416,7 @@
           <a:p>
             <a:fld id="{ED6E0A59-74F8-478C-B1F8-38E54AC6DFA7}" type="datetimeFigureOut">
               <a:rPr lang="es-CO" smtClean="0"/>
-              <a:t>27/03/2018</a:t>
+              <a:t>30/03/2018</a:t>
             </a:fld>
             <a:endParaRPr lang="es-CO"/>
           </a:p>
@@ -591,7 +596,7 @@
           <a:p>
             <a:fld id="{ED6E0A59-74F8-478C-B1F8-38E54AC6DFA7}" type="datetimeFigureOut">
               <a:rPr lang="es-CO" smtClean="0"/>
-              <a:t>27/03/2018</a:t>
+              <a:t>30/03/2018</a:t>
             </a:fld>
             <a:endParaRPr lang="es-CO"/>
           </a:p>
@@ -761,7 +766,7 @@
           <a:p>
             <a:fld id="{ED6E0A59-74F8-478C-B1F8-38E54AC6DFA7}" type="datetimeFigureOut">
               <a:rPr lang="es-CO" smtClean="0"/>
-              <a:t>27/03/2018</a:t>
+              <a:t>30/03/2018</a:t>
             </a:fld>
             <a:endParaRPr lang="es-CO"/>
           </a:p>
@@ -1007,7 +1012,7 @@
           <a:p>
             <a:fld id="{ED6E0A59-74F8-478C-B1F8-38E54AC6DFA7}" type="datetimeFigureOut">
               <a:rPr lang="es-CO" smtClean="0"/>
-              <a:t>27/03/2018</a:t>
+              <a:t>30/03/2018</a:t>
             </a:fld>
             <a:endParaRPr lang="es-CO"/>
           </a:p>
@@ -1239,7 +1244,7 @@
           <a:p>
             <a:fld id="{ED6E0A59-74F8-478C-B1F8-38E54AC6DFA7}" type="datetimeFigureOut">
               <a:rPr lang="es-CO" smtClean="0"/>
-              <a:t>27/03/2018</a:t>
+              <a:t>30/03/2018</a:t>
             </a:fld>
             <a:endParaRPr lang="es-CO"/>
           </a:p>
@@ -1606,7 +1611,7 @@
           <a:p>
             <a:fld id="{ED6E0A59-74F8-478C-B1F8-38E54AC6DFA7}" type="datetimeFigureOut">
               <a:rPr lang="es-CO" smtClean="0"/>
-              <a:t>27/03/2018</a:t>
+              <a:t>30/03/2018</a:t>
             </a:fld>
             <a:endParaRPr lang="es-CO"/>
           </a:p>
@@ -1724,7 +1729,7 @@
           <a:p>
             <a:fld id="{ED6E0A59-74F8-478C-B1F8-38E54AC6DFA7}" type="datetimeFigureOut">
               <a:rPr lang="es-CO" smtClean="0"/>
-              <a:t>27/03/2018</a:t>
+              <a:t>30/03/2018</a:t>
             </a:fld>
             <a:endParaRPr lang="es-CO"/>
           </a:p>
@@ -1819,7 +1824,7 @@
           <a:p>
             <a:fld id="{ED6E0A59-74F8-478C-B1F8-38E54AC6DFA7}" type="datetimeFigureOut">
               <a:rPr lang="es-CO" smtClean="0"/>
-              <a:t>27/03/2018</a:t>
+              <a:t>30/03/2018</a:t>
             </a:fld>
             <a:endParaRPr lang="es-CO"/>
           </a:p>
@@ -2096,7 +2101,7 @@
           <a:p>
             <a:fld id="{ED6E0A59-74F8-478C-B1F8-38E54AC6DFA7}" type="datetimeFigureOut">
               <a:rPr lang="es-CO" smtClean="0"/>
-              <a:t>27/03/2018</a:t>
+              <a:t>30/03/2018</a:t>
             </a:fld>
             <a:endParaRPr lang="es-CO"/>
           </a:p>
@@ -2349,7 +2354,7 @@
           <a:p>
             <a:fld id="{ED6E0A59-74F8-478C-B1F8-38E54AC6DFA7}" type="datetimeFigureOut">
               <a:rPr lang="es-CO" smtClean="0"/>
-              <a:t>27/03/2018</a:t>
+              <a:t>30/03/2018</a:t>
             </a:fld>
             <a:endParaRPr lang="es-CO"/>
           </a:p>
@@ -2562,7 +2567,7 @@
           <a:p>
             <a:fld id="{ED6E0A59-74F8-478C-B1F8-38E54AC6DFA7}" type="datetimeFigureOut">
               <a:rPr lang="es-CO" smtClean="0"/>
-              <a:t>27/03/2018</a:t>
+              <a:t>30/03/2018</a:t>
             </a:fld>
             <a:endParaRPr lang="es-CO"/>
           </a:p>
@@ -6381,7 +6386,7 @@
             <a:pPr algn="ctr"/>
             <a:r>
               <a:rPr lang="es-CO" sz="1200" b="1" dirty="0" smtClean="0"/>
-              <a:t>IMPRIMIR</a:t>
+              <a:t>SALIR</a:t>
             </a:r>
             <a:endParaRPr lang="es-CO" sz="1200" b="1" dirty="0"/>
           </a:p>
@@ -6577,6 +6582,170 @@
           </a:prstGeom>
         </p:spPr>
       </p:pic>
+      <p:sp>
+        <p:nvSpPr>
+          <p:cNvPr id="55" name="Rectángulo 54"/>
+          <p:cNvSpPr/>
+          <p:nvPr/>
+        </p:nvSpPr>
+        <p:spPr>
+          <a:xfrm>
+            <a:off x="7879375" y="4153427"/>
+            <a:ext cx="1264625" cy="238839"/>
+          </a:xfrm>
+          <a:prstGeom prst="rect">
+            <a:avLst/>
+          </a:prstGeom>
+          <a:solidFill>
+            <a:schemeClr val="accent4"/>
+          </a:solidFill>
+          <a:ln w="19050">
+            <a:solidFill>
+              <a:schemeClr val="accent2"/>
+            </a:solidFill>
+          </a:ln>
+        </p:spPr>
+        <p:style>
+          <a:lnRef idx="2">
+            <a:schemeClr val="accent1">
+              <a:shade val="50000"/>
+            </a:schemeClr>
+          </a:lnRef>
+          <a:fillRef idx="1">
+            <a:schemeClr val="accent1"/>
+          </a:fillRef>
+          <a:effectRef idx="0">
+            <a:schemeClr val="accent1"/>
+          </a:effectRef>
+          <a:fontRef idx="minor">
+            <a:schemeClr val="lt1"/>
+          </a:fontRef>
+        </p:style>
+        <p:txBody>
+          <a:bodyPr rtlCol="0" anchor="ctr"/>
+          <a:lstStyle/>
+          <a:p>
+            <a:pPr algn="ctr"/>
+            <a:r>
+              <a:rPr lang="es-CO" sz="1200" b="1" dirty="0" smtClean="0">
+                <a:solidFill>
+                  <a:schemeClr val="tx1"/>
+                </a:solidFill>
+              </a:rPr>
+              <a:t>IMPRIMIR</a:t>
+            </a:r>
+            <a:endParaRPr lang="es-CO" sz="1200" b="1" dirty="0">
+              <a:solidFill>
+                <a:schemeClr val="tx1"/>
+              </a:solidFill>
+            </a:endParaRPr>
+          </a:p>
+        </p:txBody>
+      </p:sp>
+      <p:sp>
+        <p:nvSpPr>
+          <p:cNvPr id="63" name="Rectángulo 62"/>
+          <p:cNvSpPr/>
+          <p:nvPr/>
+        </p:nvSpPr>
+        <p:spPr>
+          <a:xfrm>
+            <a:off x="6418387" y="3352558"/>
+            <a:ext cx="1264625" cy="238839"/>
+          </a:xfrm>
+          <a:prstGeom prst="rect">
+            <a:avLst/>
+          </a:prstGeom>
+          <a:solidFill>
+            <a:srgbClr val="A60A15"/>
+          </a:solidFill>
+          <a:ln w="19050">
+            <a:solidFill>
+              <a:srgbClr val="F2303D"/>
+            </a:solidFill>
+          </a:ln>
+        </p:spPr>
+        <p:style>
+          <a:lnRef idx="2">
+            <a:schemeClr val="accent1">
+              <a:shade val="50000"/>
+            </a:schemeClr>
+          </a:lnRef>
+          <a:fillRef idx="1">
+            <a:schemeClr val="accent1"/>
+          </a:fillRef>
+          <a:effectRef idx="0">
+            <a:schemeClr val="accent1"/>
+          </a:effectRef>
+          <a:fontRef idx="minor">
+            <a:schemeClr val="lt1"/>
+          </a:fontRef>
+        </p:style>
+        <p:txBody>
+          <a:bodyPr rtlCol="0" anchor="ctr"/>
+          <a:lstStyle/>
+          <a:p>
+            <a:pPr algn="ctr"/>
+            <a:r>
+              <a:rPr lang="es-CO" sz="1200" b="1" dirty="0" smtClean="0"/>
+              <a:t>ACTUALIZAR</a:t>
+            </a:r>
+            <a:endParaRPr lang="es-CO" sz="1200" b="1" dirty="0"/>
+          </a:p>
+        </p:txBody>
+      </p:sp>
+      <p:sp>
+        <p:nvSpPr>
+          <p:cNvPr id="65" name="Rectángulo 64"/>
+          <p:cNvSpPr/>
+          <p:nvPr/>
+        </p:nvSpPr>
+        <p:spPr>
+          <a:xfrm>
+            <a:off x="6418386" y="3702064"/>
+            <a:ext cx="1264625" cy="238839"/>
+          </a:xfrm>
+          <a:prstGeom prst="rect">
+            <a:avLst/>
+          </a:prstGeom>
+          <a:solidFill>
+            <a:srgbClr val="A60A15"/>
+          </a:solidFill>
+          <a:ln w="19050">
+            <a:solidFill>
+              <a:srgbClr val="F2303D"/>
+            </a:solidFill>
+          </a:ln>
+        </p:spPr>
+        <p:style>
+          <a:lnRef idx="2">
+            <a:schemeClr val="accent1">
+              <a:shade val="50000"/>
+            </a:schemeClr>
+          </a:lnRef>
+          <a:fillRef idx="1">
+            <a:schemeClr val="accent1"/>
+          </a:fillRef>
+          <a:effectRef idx="0">
+            <a:schemeClr val="accent1"/>
+          </a:effectRef>
+          <a:fontRef idx="minor">
+            <a:schemeClr val="lt1"/>
+          </a:fontRef>
+        </p:style>
+        <p:txBody>
+          <a:bodyPr rtlCol="0" anchor="ctr"/>
+          <a:lstStyle/>
+          <a:p>
+            <a:pPr algn="ctr"/>
+            <a:r>
+              <a:rPr lang="es-CO" sz="1200" b="1" dirty="0" smtClean="0"/>
+              <a:t>GUARDAR</a:t>
+            </a:r>
+            <a:endParaRPr lang="es-CO" sz="1200" b="1" dirty="0"/>
+          </a:p>
+        </p:txBody>
+      </p:sp>
     </p:spTree>
     <p:extLst>
       <p:ext uri="{BB962C8B-B14F-4D97-AF65-F5344CB8AC3E}">

</xml_diff>